<commit_message>
adding machine learning terms
</commit_message>
<xml_diff>
--- a/topic2_Linear regression/1_LR introduction.pptx
+++ b/topic2_Linear regression/1_LR introduction.pptx
@@ -511,6 +511,93 @@
 </file>
 
 <file path=ppt/notesSlides/notesSlide1.xml><?xml version="1.0" encoding="utf-8"?>
+<p:notes xmlns:a="http://schemas.openxmlformats.org/drawingml/2006/main" xmlns:r="http://schemas.openxmlformats.org/officeDocument/2006/relationships" xmlns:p="http://schemas.openxmlformats.org/presentationml/2006/main">
+  <p:cSld>
+    <p:spTree>
+      <p:nvGrpSpPr>
+        <p:cNvPr id="1" name=""/>
+        <p:cNvGrpSpPr/>
+        <p:nvPr/>
+      </p:nvGrpSpPr>
+      <p:grpSpPr>
+        <a:xfrm>
+          <a:off x="0" y="0"/>
+          <a:ext cx="0" cy="0"/>
+          <a:chOff x="0" y="0"/>
+          <a:chExt cx="0" cy="0"/>
+        </a:xfrm>
+      </p:grpSpPr>
+      <p:sp>
+        <p:nvSpPr>
+          <p:cNvPr id="2" name="Slide Image Placeholder 1"/>
+          <p:cNvSpPr>
+            <a:spLocks noGrp="1" noRot="1" noChangeAspect="1"/>
+          </p:cNvSpPr>
+          <p:nvPr>
+            <p:ph type="sldImg"/>
+          </p:nvPr>
+        </p:nvSpPr>
+        <p:spPr/>
+      </p:sp>
+      <p:sp>
+        <p:nvSpPr>
+          <p:cNvPr id="3" name="Notes Placeholder 2"/>
+          <p:cNvSpPr>
+            <a:spLocks noGrp="1"/>
+          </p:cNvSpPr>
+          <p:nvPr>
+            <p:ph type="body" idx="1"/>
+          </p:nvPr>
+        </p:nvSpPr>
+        <p:spPr/>
+        <p:txBody>
+          <a:bodyPr/>
+          <a:lstStyle/>
+          <a:p>
+            <a:r>
+              <a:rPr lang="en-US" dirty="0"/>
+              <a:t>Multiple linear regression</a:t>
+            </a:r>
+          </a:p>
+        </p:txBody>
+      </p:sp>
+      <p:sp>
+        <p:nvSpPr>
+          <p:cNvPr id="4" name="Slide Number Placeholder 3"/>
+          <p:cNvSpPr>
+            <a:spLocks noGrp="1"/>
+          </p:cNvSpPr>
+          <p:nvPr>
+            <p:ph type="sldNum" sz="quarter" idx="5"/>
+          </p:nvPr>
+        </p:nvSpPr>
+        <p:spPr/>
+        <p:txBody>
+          <a:bodyPr/>
+          <a:lstStyle/>
+          <a:p>
+            <a:fld id="{AD3EAC5A-1DAF-4146-A530-17256931B537}" type="slidenum">
+              <a:rPr lang="en-US" smtClean="0"/>
+              <a:t>5</a:t>
+            </a:fld>
+            <a:endParaRPr lang="en-US"/>
+          </a:p>
+        </p:txBody>
+      </p:sp>
+    </p:spTree>
+    <p:extLst>
+      <p:ext uri="{BB962C8B-B14F-4D97-AF65-F5344CB8AC3E}">
+        <p14:creationId xmlns:p14="http://schemas.microsoft.com/office/powerpoint/2010/main" val="3311570436"/>
+      </p:ext>
+    </p:extLst>
+  </p:cSld>
+  <p:clrMapOvr>
+    <a:masterClrMapping/>
+  </p:clrMapOvr>
+</p:notes>
+</file>
+
+<file path=ppt/notesSlides/notesSlide2.xml><?xml version="1.0" encoding="utf-8"?>
 <p:notes xmlns:a="http://schemas.openxmlformats.org/drawingml/2006/main" xmlns:r="http://schemas.openxmlformats.org/officeDocument/2006/relationships" xmlns:p="http://schemas.openxmlformats.org/presentationml/2006/main">
   <p:cSld>
     <p:spTree>

</xml_diff>